<commit_message>
added slides to Presentation
</commit_message>
<xml_diff>
--- a/Intimo_current_vs_new.pptx
+++ b/Intimo_current_vs_new.pptx
@@ -118,7 +118,7 @@
   </p:defaultTextStyle>
   <p:extLst>
     <p:ext uri="{521415D9-36F7-43E2-AB2F-B90AF26B5E84}">
-      <p14:sectionLst xmlns="" xmlns:p14="http://schemas.microsoft.com/office/powerpoint/2010/main">
+      <p14:sectionLst xmlns:p14="http://schemas.microsoft.com/office/powerpoint/2010/main" xmlns="">
         <p14:section name="Default Section" id="{440C63B1-D4C4-4C0A-91A1-A14B0150CDA9}">
           <p14:sldIdLst>
             <p14:sldId id="256"/>
@@ -134,7 +134,7 @@
       </p14:sectionLst>
     </p:ext>
     <p:ext uri="{EFAFB233-063F-42B5-8137-9DF3F51BA10A}">
-      <p15:sldGuideLst xmlns="" xmlns:p15="http://schemas.microsoft.com/office/powerpoint/2012/main"/>
+      <p15:sldGuideLst xmlns:p15="http://schemas.microsoft.com/office/powerpoint/2012/main" xmlns=""/>
     </p:ext>
   </p:extLst>
 </p:presentation>
@@ -174,7 +174,7 @@
           <a:blip r:embed="rId2">
             <a:extLst>
               <a:ext uri="{28A0092B-C50C-407E-A947-70E740481C1C}">
-                <a14:useLocalDpi xmlns="" xmlns:a14="http://schemas.microsoft.com/office/drawing/2010/main" val="0"/>
+                <a14:useLocalDpi xmlns:a14="http://schemas.microsoft.com/office/drawing/2010/main" xmlns="" val="0"/>
               </a:ext>
             </a:extLst>
           </a:blip>
@@ -466,7 +466,7 @@
           <a:blip r:embed="rId2">
             <a:extLst>
               <a:ext uri="{28A0092B-C50C-407E-A947-70E740481C1C}">
-                <a14:useLocalDpi xmlns="" xmlns:a14="http://schemas.microsoft.com/office/drawing/2010/main" val="0"/>
+                <a14:useLocalDpi xmlns:a14="http://schemas.microsoft.com/office/drawing/2010/main" xmlns="" val="0"/>
               </a:ext>
             </a:extLst>
           </a:blip>
@@ -787,7 +787,7 @@
           <a:blip r:embed="rId2">
             <a:extLst>
               <a:ext uri="{28A0092B-C50C-407E-A947-70E740481C1C}">
-                <a14:useLocalDpi xmlns="" xmlns:a14="http://schemas.microsoft.com/office/drawing/2010/main" val="0"/>
+                <a14:useLocalDpi xmlns:a14="http://schemas.microsoft.com/office/drawing/2010/main" xmlns="" val="0"/>
               </a:ext>
             </a:extLst>
           </a:blip>
@@ -1062,7 +1062,7 @@
           <a:blip r:embed="rId2">
             <a:extLst>
               <a:ext uri="{28A0092B-C50C-407E-A947-70E740481C1C}">
-                <a14:useLocalDpi xmlns="" xmlns:a14="http://schemas.microsoft.com/office/drawing/2010/main" val="0"/>
+                <a14:useLocalDpi xmlns:a14="http://schemas.microsoft.com/office/drawing/2010/main" xmlns="" val="0"/>
               </a:ext>
             </a:extLst>
           </a:blip>
@@ -1627,7 +1627,7 @@
           <a:blip r:embed="rId2">
             <a:extLst>
               <a:ext uri="{28A0092B-C50C-407E-A947-70E740481C1C}">
-                <a14:useLocalDpi xmlns="" xmlns:a14="http://schemas.microsoft.com/office/drawing/2010/main" val="0"/>
+                <a14:useLocalDpi xmlns:a14="http://schemas.microsoft.com/office/drawing/2010/main" xmlns="" val="0"/>
               </a:ext>
             </a:extLst>
           </a:blip>
@@ -1902,7 +1902,7 @@
           <a:blip r:embed="rId2">
             <a:extLst>
               <a:ext uri="{28A0092B-C50C-407E-A947-70E740481C1C}">
-                <a14:useLocalDpi xmlns="" xmlns:a14="http://schemas.microsoft.com/office/drawing/2010/main" val="0"/>
+                <a14:useLocalDpi xmlns:a14="http://schemas.microsoft.com/office/drawing/2010/main" xmlns="" val="0"/>
               </a:ext>
             </a:extLst>
           </a:blip>
@@ -2461,7 +2461,7 @@
           <a:blip r:embed="rId2">
             <a:extLst>
               <a:ext uri="{28A0092B-C50C-407E-A947-70E740481C1C}">
-                <a14:useLocalDpi xmlns="" xmlns:a14="http://schemas.microsoft.com/office/drawing/2010/main" val="0"/>
+                <a14:useLocalDpi xmlns:a14="http://schemas.microsoft.com/office/drawing/2010/main" xmlns="" val="0"/>
               </a:ext>
             </a:extLst>
           </a:blip>
@@ -2785,7 +2785,7 @@
           <a:blip r:embed="rId2">
             <a:extLst>
               <a:ext uri="{28A0092B-C50C-407E-A947-70E740481C1C}">
-                <a14:useLocalDpi xmlns="" xmlns:a14="http://schemas.microsoft.com/office/drawing/2010/main" val="0"/>
+                <a14:useLocalDpi xmlns:a14="http://schemas.microsoft.com/office/drawing/2010/main" xmlns="" val="0"/>
               </a:ext>
             </a:extLst>
           </a:blip>
@@ -2987,7 +2987,7 @@
           <a:blip r:embed="rId2">
             <a:extLst>
               <a:ext uri="{28A0092B-C50C-407E-A947-70E740481C1C}">
-                <a14:useLocalDpi xmlns="" xmlns:a14="http://schemas.microsoft.com/office/drawing/2010/main" val="0"/>
+                <a14:useLocalDpi xmlns:a14="http://schemas.microsoft.com/office/drawing/2010/main" xmlns="" val="0"/>
               </a:ext>
             </a:extLst>
           </a:blip>
@@ -3194,7 +3194,7 @@
           <a:blip r:embed="rId2">
             <a:extLst>
               <a:ext uri="{28A0092B-C50C-407E-A947-70E740481C1C}">
-                <a14:useLocalDpi xmlns="" xmlns:a14="http://schemas.microsoft.com/office/drawing/2010/main" val="0"/>
+                <a14:useLocalDpi xmlns:a14="http://schemas.microsoft.com/office/drawing/2010/main" xmlns="" val="0"/>
               </a:ext>
             </a:extLst>
           </a:blip>
@@ -3391,7 +3391,7 @@
           <a:blip r:embed="rId2">
             <a:extLst>
               <a:ext uri="{28A0092B-C50C-407E-A947-70E740481C1C}">
-                <a14:useLocalDpi xmlns="" xmlns:a14="http://schemas.microsoft.com/office/drawing/2010/main" val="0"/>
+                <a14:useLocalDpi xmlns:a14="http://schemas.microsoft.com/office/drawing/2010/main" xmlns="" val="0"/>
               </a:ext>
             </a:extLst>
           </a:blip>
@@ -3664,7 +3664,7 @@
           <a:blip r:embed="rId2">
             <a:extLst>
               <a:ext uri="{28A0092B-C50C-407E-A947-70E740481C1C}">
-                <a14:useLocalDpi xmlns="" xmlns:a14="http://schemas.microsoft.com/office/drawing/2010/main" val="0"/>
+                <a14:useLocalDpi xmlns:a14="http://schemas.microsoft.com/office/drawing/2010/main" xmlns="" val="0"/>
               </a:ext>
             </a:extLst>
           </a:blip>
@@ -4298,7 +4298,7 @@
           <a:blip r:embed="rId2">
             <a:extLst>
               <a:ext uri="{28A0092B-C50C-407E-A947-70E740481C1C}">
-                <a14:useLocalDpi xmlns="" xmlns:a14="http://schemas.microsoft.com/office/drawing/2010/main" val="0"/>
+                <a14:useLocalDpi xmlns:a14="http://schemas.microsoft.com/office/drawing/2010/main" xmlns="" val="0"/>
               </a:ext>
             </a:extLst>
           </a:blip>
@@ -4443,7 +4443,7 @@
           <a:blip r:embed="rId2">
             <a:extLst>
               <a:ext uri="{28A0092B-C50C-407E-A947-70E740481C1C}">
-                <a14:useLocalDpi xmlns="" xmlns:a14="http://schemas.microsoft.com/office/drawing/2010/main" val="0"/>
+                <a14:useLocalDpi xmlns:a14="http://schemas.microsoft.com/office/drawing/2010/main" xmlns="" val="0"/>
               </a:ext>
             </a:extLst>
           </a:blip>
@@ -4565,7 +4565,7 @@
           <a:blip r:embed="rId2">
             <a:extLst>
               <a:ext uri="{28A0092B-C50C-407E-A947-70E740481C1C}">
-                <a14:useLocalDpi xmlns="" xmlns:a14="http://schemas.microsoft.com/office/drawing/2010/main" val="0"/>
+                <a14:useLocalDpi xmlns:a14="http://schemas.microsoft.com/office/drawing/2010/main" xmlns="" val="0"/>
               </a:ext>
             </a:extLst>
           </a:blip>
@@ -4847,7 +4847,7 @@
           <a:blip r:embed="rId2">
             <a:extLst>
               <a:ext uri="{28A0092B-C50C-407E-A947-70E740481C1C}">
-                <a14:useLocalDpi xmlns="" xmlns:a14="http://schemas.microsoft.com/office/drawing/2010/main" val="0"/>
+                <a14:useLocalDpi xmlns:a14="http://schemas.microsoft.com/office/drawing/2010/main" xmlns="" val="0"/>
               </a:ext>
             </a:extLst>
           </a:blip>
@@ -5910,7 +5910,7 @@
     </p:spTree>
     <p:extLst>
       <p:ext uri="{BB962C8B-B14F-4D97-AF65-F5344CB8AC3E}">
-        <p14:creationId xmlns="" xmlns:p14="http://schemas.microsoft.com/office/powerpoint/2010/main" val="3908671756"/>
+        <p14:creationId xmlns:p14="http://schemas.microsoft.com/office/powerpoint/2010/main" xmlns="" val="3908671756"/>
       </p:ext>
     </p:extLst>
   </p:cSld>
@@ -6264,19 +6264,11 @@
           <a:p>
             <a:r>
               <a:rPr lang="en-US" dirty="0" smtClean="0"/>
-              <a:t>Project </a:t>
-            </a:r>
-            <a:r>
-              <a:rPr lang="en-US" dirty="0" smtClean="0"/>
-              <a:t>Requirements </a:t>
+              <a:t>Project Requirements </a:t>
             </a:r>
             <a:r>
               <a:rPr lang="en-US" sz="2000" dirty="0" smtClean="0"/>
-              <a:t>(draft</a:t>
-            </a:r>
-            <a:r>
-              <a:rPr lang="en-US" sz="2000" dirty="0" smtClean="0"/>
-              <a:t>)</a:t>
+              <a:t>(draft)</a:t>
             </a:r>
             <a:endParaRPr lang="en-US" dirty="0"/>
           </a:p>
@@ -6304,19 +6296,7 @@
           <a:p>
             <a:r>
               <a:rPr lang="en-US" sz="2800" dirty="0" smtClean="0"/>
-              <a:t>Get to know </a:t>
-            </a:r>
-            <a:r>
-              <a:rPr lang="en-US" sz="2800" dirty="0" smtClean="0"/>
-              <a:t>New </a:t>
-            </a:r>
-            <a:r>
-              <a:rPr lang="en-US" sz="2800" dirty="0" smtClean="0"/>
-              <a:t>Yahoo </a:t>
-            </a:r>
-            <a:r>
-              <a:rPr lang="en-US" sz="2800" dirty="0" smtClean="0"/>
-              <a:t>platform:</a:t>
+              <a:t>Get to know New Yahoo platform:</a:t>
             </a:r>
           </a:p>
           <a:p>
@@ -6325,7 +6305,6 @@
               <a:rPr lang="en-US" sz="2600" dirty="0" smtClean="0"/>
               <a:t>Node.js, DUST</a:t>
             </a:r>
-            <a:endParaRPr lang="en-US" sz="2600" dirty="0" smtClean="0"/>
           </a:p>
           <a:p>
             <a:r>
@@ -6364,13 +6343,8 @@
             <a:pPr lvl="1"/>
             <a:r>
               <a:rPr lang="en-US" sz="2600" dirty="0" smtClean="0"/>
-              <a:t>Same size </a:t>
-            </a:r>
-            <a:r>
-              <a:rPr lang="en-US" sz="2600" dirty="0" smtClean="0"/>
-              <a:t>photos, item names visibility</a:t>
-            </a:r>
-            <a:endParaRPr lang="en-US" sz="2600" dirty="0" smtClean="0"/>
+              <a:t>Same size photos, item names visibility</a:t>
+            </a:r>
           </a:p>
           <a:p>
             <a:endParaRPr lang="en-US" dirty="0"/>
@@ -6470,7 +6444,7 @@
     </p:spTree>
     <p:extLst>
       <p:ext uri="{BB962C8B-B14F-4D97-AF65-F5344CB8AC3E}">
-        <p14:creationId xmlns="" xmlns:p14="http://schemas.microsoft.com/office/powerpoint/2010/main" val="766318711"/>
+        <p14:creationId xmlns:p14="http://schemas.microsoft.com/office/powerpoint/2010/main" xmlns="" val="766318711"/>
       </p:ext>
     </p:extLst>
   </p:cSld>
@@ -6509,8 +6483,8 @@
         </p:nvSpPr>
         <p:spPr>
           <a:xfrm>
-            <a:off x="709552" y="431471"/>
-            <a:ext cx="10131425" cy="577932"/>
+            <a:off x="721427" y="225631"/>
+            <a:ext cx="10131425" cy="498764"/>
           </a:xfrm>
         </p:spPr>
         <p:txBody>
@@ -6521,37 +6495,47 @@
           <a:p>
             <a:pPr algn="ctr"/>
             <a:r>
-              <a:rPr lang="en-US" dirty="0" err="1" smtClean="0"/>
+              <a:rPr lang="en-US" dirty="0" smtClean="0"/>
               <a:t>GitHub</a:t>
             </a:r>
             <a:endParaRPr lang="en-US" dirty="0"/>
           </a:p>
         </p:txBody>
       </p:sp>
-      <p:sp>
-        <p:nvSpPr>
-          <p:cNvPr id="3" name="Content Placeholder 2"/>
-          <p:cNvSpPr>
-            <a:spLocks noGrp="1"/>
-          </p:cNvSpPr>
+      <p:pic>
+        <p:nvPicPr>
+          <p:cNvPr id="1026" name="Picture 2"/>
+          <p:cNvPicPr>
+            <a:picLocks noGrp="1" noChangeAspect="1" noChangeArrowheads="1"/>
+          </p:cNvPicPr>
           <p:nvPr>
             <p:ph idx="1"/>
           </p:nvPr>
-        </p:nvSpPr>
-        <p:spPr>
-          <a:xfrm>
-            <a:off x="685801" y="1579417"/>
-            <a:ext cx="10690760" cy="4762005"/>
-          </a:xfrm>
-        </p:spPr>
-        <p:txBody>
-          <a:bodyPr/>
-          <a:lstStyle/>
-          <a:p>
-            <a:endParaRPr lang="en-US" dirty="0"/>
-          </a:p>
-        </p:txBody>
-      </p:sp>
+        </p:nvPicPr>
+        <p:blipFill>
+          <a:blip r:embed="rId2"/>
+          <a:srcRect/>
+          <a:stretch>
+            <a:fillRect/>
+          </a:stretch>
+        </p:blipFill>
+        <p:spPr bwMode="auto">
+          <a:xfrm>
+            <a:off x="1852550" y="712519"/>
+            <a:ext cx="8312727" cy="5984998"/>
+          </a:xfrm>
+          <a:prstGeom prst="rect">
+            <a:avLst/>
+          </a:prstGeom>
+          <a:noFill/>
+          <a:ln w="9525">
+            <a:noFill/>
+            <a:miter lim="800000"/>
+            <a:headEnd/>
+            <a:tailEnd/>
+          </a:ln>
+        </p:spPr>
+      </p:pic>
     </p:spTree>
   </p:cSld>
   <p:clrMapOvr>
@@ -6655,11 +6639,7 @@
           <a:p>
             <a:r>
               <a:rPr lang="en-US" dirty="0" smtClean="0"/>
-              <a:t>Allows user to create and manage a  simple webpage for a small merchant </a:t>
-            </a:r>
-            <a:r>
-              <a:rPr lang="en-US" dirty="0" smtClean="0"/>
-              <a:t>business</a:t>
+              <a:t>Allows user to create and manage a  simple webpage for a small merchant business</a:t>
             </a:r>
             <a:endParaRPr lang="en-US" dirty="0"/>
           </a:p>
@@ -6668,7 +6648,7 @@
     </p:spTree>
     <p:extLst>
       <p:ext uri="{BB962C8B-B14F-4D97-AF65-F5344CB8AC3E}">
-        <p14:creationId xmlns="" xmlns:p14="http://schemas.microsoft.com/office/powerpoint/2010/main" val="2234607762"/>
+        <p14:creationId xmlns:p14="http://schemas.microsoft.com/office/powerpoint/2010/main" xmlns="" val="2234607762"/>
       </p:ext>
     </p:extLst>
   </p:cSld>
@@ -6839,7 +6819,7 @@
     </p:spTree>
     <p:extLst>
       <p:ext uri="{BB962C8B-B14F-4D97-AF65-F5344CB8AC3E}">
-        <p14:creationId xmlns="" xmlns:p14="http://schemas.microsoft.com/office/powerpoint/2010/main" val="2068207568"/>
+        <p14:creationId xmlns:p14="http://schemas.microsoft.com/office/powerpoint/2010/main" xmlns="" val="2068207568"/>
       </p:ext>
     </p:extLst>
   </p:cSld>
@@ -6955,7 +6935,7 @@
     </p:spTree>
     <p:extLst>
       <p:ext uri="{BB962C8B-B14F-4D97-AF65-F5344CB8AC3E}">
-        <p14:creationId xmlns="" xmlns:p14="http://schemas.microsoft.com/office/powerpoint/2010/main" val="2504166292"/>
+        <p14:creationId xmlns:p14="http://schemas.microsoft.com/office/powerpoint/2010/main" xmlns="" val="2504166292"/>
       </p:ext>
     </p:extLst>
   </p:cSld>
@@ -7066,7 +7046,7 @@
     </p:spTree>
     <p:extLst>
       <p:ext uri="{BB962C8B-B14F-4D97-AF65-F5344CB8AC3E}">
-        <p14:creationId xmlns="" xmlns:p14="http://schemas.microsoft.com/office/powerpoint/2010/main" val="1620377186"/>
+        <p14:creationId xmlns:p14="http://schemas.microsoft.com/office/powerpoint/2010/main" xmlns="" val="1620377186"/>
       </p:ext>
     </p:extLst>
   </p:cSld>
@@ -7181,7 +7161,7 @@
     </p:spTree>
     <p:extLst>
       <p:ext uri="{BB962C8B-B14F-4D97-AF65-F5344CB8AC3E}">
-        <p14:creationId xmlns="" xmlns:p14="http://schemas.microsoft.com/office/powerpoint/2010/main" val="212756996"/>
+        <p14:creationId xmlns:p14="http://schemas.microsoft.com/office/powerpoint/2010/main" xmlns="" val="212756996"/>
       </p:ext>
     </p:extLst>
   </p:cSld>
@@ -7232,11 +7212,7 @@
           <a:p>
             <a:r>
               <a:rPr lang="en-US" dirty="0" smtClean="0"/>
-              <a:t>Intimo </a:t>
-            </a:r>
-            <a:r>
-              <a:rPr lang="en-US" dirty="0" smtClean="0"/>
-              <a:t>look on new platform </a:t>
+              <a:t>Intimo look on new platform </a:t>
             </a:r>
             <a:r>
               <a:rPr lang="en-US" sz="2000" dirty="0" smtClean="0"/>
@@ -7531,7 +7507,7 @@
   <a:extraClrSchemeLst/>
   <a:extLst>
     <a:ext uri="{05A4C25C-085E-4340-85A3-A5531E510DB2}">
-      <thm15:themeFamily xmlns="" xmlns:thm15="http://schemas.microsoft.com/office/thememl/2012/main" name="Celestial" id="{C4BB2A3D-0E93-4C5F-B0D2-9D3FCE089CC5}" vid="{42E5908D-19A2-46FD-89FA-638B126129EF}"/>
+      <thm15:themeFamily xmlns:thm15="http://schemas.microsoft.com/office/thememl/2012/main" xmlns="" name="Celestial" id="{C4BB2A3D-0E93-4C5F-B0D2-9D3FCE089CC5}" vid="{42E5908D-19A2-46FD-89FA-638B126129EF}"/>
     </a:ext>
   </a:extLst>
 </a:theme>

</xml_diff>

<commit_message>
added slide to Presentation
</commit_message>
<xml_diff>
--- a/Intimo_current_vs_new.pptx
+++ b/Intimo_current_vs_new.pptx
@@ -118,7 +118,7 @@
   </p:defaultTextStyle>
   <p:extLst>
     <p:ext uri="{521415D9-36F7-43E2-AB2F-B90AF26B5E84}">
-      <p14:sectionLst xmlns:p14="http://schemas.microsoft.com/office/powerpoint/2010/main" xmlns="">
+      <p14:sectionLst xmlns="" xmlns:p14="http://schemas.microsoft.com/office/powerpoint/2010/main">
         <p14:section name="Default Section" id="{440C63B1-D4C4-4C0A-91A1-A14B0150CDA9}">
           <p14:sldIdLst>
             <p14:sldId id="256"/>
@@ -134,7 +134,7 @@
       </p14:sectionLst>
     </p:ext>
     <p:ext uri="{EFAFB233-063F-42B5-8137-9DF3F51BA10A}">
-      <p15:sldGuideLst xmlns:p15="http://schemas.microsoft.com/office/powerpoint/2012/main" xmlns=""/>
+      <p15:sldGuideLst xmlns="" xmlns:p15="http://schemas.microsoft.com/office/powerpoint/2012/main"/>
     </p:ext>
   </p:extLst>
 </p:presentation>
@@ -174,7 +174,7 @@
           <a:blip r:embed="rId2">
             <a:extLst>
               <a:ext uri="{28A0092B-C50C-407E-A947-70E740481C1C}">
-                <a14:useLocalDpi xmlns:a14="http://schemas.microsoft.com/office/drawing/2010/main" xmlns="" val="0"/>
+                <a14:useLocalDpi xmlns="" xmlns:a14="http://schemas.microsoft.com/office/drawing/2010/main" val="0"/>
               </a:ext>
             </a:extLst>
           </a:blip>
@@ -466,7 +466,7 @@
           <a:blip r:embed="rId2">
             <a:extLst>
               <a:ext uri="{28A0092B-C50C-407E-A947-70E740481C1C}">
-                <a14:useLocalDpi xmlns:a14="http://schemas.microsoft.com/office/drawing/2010/main" xmlns="" val="0"/>
+                <a14:useLocalDpi xmlns="" xmlns:a14="http://schemas.microsoft.com/office/drawing/2010/main" val="0"/>
               </a:ext>
             </a:extLst>
           </a:blip>
@@ -787,7 +787,7 @@
           <a:blip r:embed="rId2">
             <a:extLst>
               <a:ext uri="{28A0092B-C50C-407E-A947-70E740481C1C}">
-                <a14:useLocalDpi xmlns:a14="http://schemas.microsoft.com/office/drawing/2010/main" xmlns="" val="0"/>
+                <a14:useLocalDpi xmlns="" xmlns:a14="http://schemas.microsoft.com/office/drawing/2010/main" val="0"/>
               </a:ext>
             </a:extLst>
           </a:blip>
@@ -1062,7 +1062,7 @@
           <a:blip r:embed="rId2">
             <a:extLst>
               <a:ext uri="{28A0092B-C50C-407E-A947-70E740481C1C}">
-                <a14:useLocalDpi xmlns:a14="http://schemas.microsoft.com/office/drawing/2010/main" xmlns="" val="0"/>
+                <a14:useLocalDpi xmlns="" xmlns:a14="http://schemas.microsoft.com/office/drawing/2010/main" val="0"/>
               </a:ext>
             </a:extLst>
           </a:blip>
@@ -1627,7 +1627,7 @@
           <a:blip r:embed="rId2">
             <a:extLst>
               <a:ext uri="{28A0092B-C50C-407E-A947-70E740481C1C}">
-                <a14:useLocalDpi xmlns:a14="http://schemas.microsoft.com/office/drawing/2010/main" xmlns="" val="0"/>
+                <a14:useLocalDpi xmlns="" xmlns:a14="http://schemas.microsoft.com/office/drawing/2010/main" val="0"/>
               </a:ext>
             </a:extLst>
           </a:blip>
@@ -1902,7 +1902,7 @@
           <a:blip r:embed="rId2">
             <a:extLst>
               <a:ext uri="{28A0092B-C50C-407E-A947-70E740481C1C}">
-                <a14:useLocalDpi xmlns:a14="http://schemas.microsoft.com/office/drawing/2010/main" xmlns="" val="0"/>
+                <a14:useLocalDpi xmlns="" xmlns:a14="http://schemas.microsoft.com/office/drawing/2010/main" val="0"/>
               </a:ext>
             </a:extLst>
           </a:blip>
@@ -2461,7 +2461,7 @@
           <a:blip r:embed="rId2">
             <a:extLst>
               <a:ext uri="{28A0092B-C50C-407E-A947-70E740481C1C}">
-                <a14:useLocalDpi xmlns:a14="http://schemas.microsoft.com/office/drawing/2010/main" xmlns="" val="0"/>
+                <a14:useLocalDpi xmlns="" xmlns:a14="http://schemas.microsoft.com/office/drawing/2010/main" val="0"/>
               </a:ext>
             </a:extLst>
           </a:blip>
@@ -2785,7 +2785,7 @@
           <a:blip r:embed="rId2">
             <a:extLst>
               <a:ext uri="{28A0092B-C50C-407E-A947-70E740481C1C}">
-                <a14:useLocalDpi xmlns:a14="http://schemas.microsoft.com/office/drawing/2010/main" xmlns="" val="0"/>
+                <a14:useLocalDpi xmlns="" xmlns:a14="http://schemas.microsoft.com/office/drawing/2010/main" val="0"/>
               </a:ext>
             </a:extLst>
           </a:blip>
@@ -2987,7 +2987,7 @@
           <a:blip r:embed="rId2">
             <a:extLst>
               <a:ext uri="{28A0092B-C50C-407E-A947-70E740481C1C}">
-                <a14:useLocalDpi xmlns:a14="http://schemas.microsoft.com/office/drawing/2010/main" xmlns="" val="0"/>
+                <a14:useLocalDpi xmlns="" xmlns:a14="http://schemas.microsoft.com/office/drawing/2010/main" val="0"/>
               </a:ext>
             </a:extLst>
           </a:blip>
@@ -3194,7 +3194,7 @@
           <a:blip r:embed="rId2">
             <a:extLst>
               <a:ext uri="{28A0092B-C50C-407E-A947-70E740481C1C}">
-                <a14:useLocalDpi xmlns:a14="http://schemas.microsoft.com/office/drawing/2010/main" xmlns="" val="0"/>
+                <a14:useLocalDpi xmlns="" xmlns:a14="http://schemas.microsoft.com/office/drawing/2010/main" val="0"/>
               </a:ext>
             </a:extLst>
           </a:blip>
@@ -3391,7 +3391,7 @@
           <a:blip r:embed="rId2">
             <a:extLst>
               <a:ext uri="{28A0092B-C50C-407E-A947-70E740481C1C}">
-                <a14:useLocalDpi xmlns:a14="http://schemas.microsoft.com/office/drawing/2010/main" xmlns="" val="0"/>
+                <a14:useLocalDpi xmlns="" xmlns:a14="http://schemas.microsoft.com/office/drawing/2010/main" val="0"/>
               </a:ext>
             </a:extLst>
           </a:blip>
@@ -3664,7 +3664,7 @@
           <a:blip r:embed="rId2">
             <a:extLst>
               <a:ext uri="{28A0092B-C50C-407E-A947-70E740481C1C}">
-                <a14:useLocalDpi xmlns:a14="http://schemas.microsoft.com/office/drawing/2010/main" xmlns="" val="0"/>
+                <a14:useLocalDpi xmlns="" xmlns:a14="http://schemas.microsoft.com/office/drawing/2010/main" val="0"/>
               </a:ext>
             </a:extLst>
           </a:blip>
@@ -4298,7 +4298,7 @@
           <a:blip r:embed="rId2">
             <a:extLst>
               <a:ext uri="{28A0092B-C50C-407E-A947-70E740481C1C}">
-                <a14:useLocalDpi xmlns:a14="http://schemas.microsoft.com/office/drawing/2010/main" xmlns="" val="0"/>
+                <a14:useLocalDpi xmlns="" xmlns:a14="http://schemas.microsoft.com/office/drawing/2010/main" val="0"/>
               </a:ext>
             </a:extLst>
           </a:blip>
@@ -4443,7 +4443,7 @@
           <a:blip r:embed="rId2">
             <a:extLst>
               <a:ext uri="{28A0092B-C50C-407E-A947-70E740481C1C}">
-                <a14:useLocalDpi xmlns:a14="http://schemas.microsoft.com/office/drawing/2010/main" xmlns="" val="0"/>
+                <a14:useLocalDpi xmlns="" xmlns:a14="http://schemas.microsoft.com/office/drawing/2010/main" val="0"/>
               </a:ext>
             </a:extLst>
           </a:blip>
@@ -4565,7 +4565,7 @@
           <a:blip r:embed="rId2">
             <a:extLst>
               <a:ext uri="{28A0092B-C50C-407E-A947-70E740481C1C}">
-                <a14:useLocalDpi xmlns:a14="http://schemas.microsoft.com/office/drawing/2010/main" xmlns="" val="0"/>
+                <a14:useLocalDpi xmlns="" xmlns:a14="http://schemas.microsoft.com/office/drawing/2010/main" val="0"/>
               </a:ext>
             </a:extLst>
           </a:blip>
@@ -4847,7 +4847,7 @@
           <a:blip r:embed="rId2">
             <a:extLst>
               <a:ext uri="{28A0092B-C50C-407E-A947-70E740481C1C}">
-                <a14:useLocalDpi xmlns:a14="http://schemas.microsoft.com/office/drawing/2010/main" xmlns="" val="0"/>
+                <a14:useLocalDpi xmlns="" xmlns:a14="http://schemas.microsoft.com/office/drawing/2010/main" val="0"/>
               </a:ext>
             </a:extLst>
           </a:blip>
@@ -5910,7 +5910,7 @@
     </p:spTree>
     <p:extLst>
       <p:ext uri="{BB962C8B-B14F-4D97-AF65-F5344CB8AC3E}">
-        <p14:creationId xmlns:p14="http://schemas.microsoft.com/office/powerpoint/2010/main" xmlns="" val="3908671756"/>
+        <p14:creationId xmlns="" xmlns:p14="http://schemas.microsoft.com/office/powerpoint/2010/main" val="3908671756"/>
       </p:ext>
     </p:extLst>
   </p:cSld>
@@ -6444,7 +6444,7 @@
     </p:spTree>
     <p:extLst>
       <p:ext uri="{BB962C8B-B14F-4D97-AF65-F5344CB8AC3E}">
-        <p14:creationId xmlns:p14="http://schemas.microsoft.com/office/powerpoint/2010/main" xmlns="" val="766318711"/>
+        <p14:creationId xmlns="" xmlns:p14="http://schemas.microsoft.com/office/powerpoint/2010/main" val="766318711"/>
       </p:ext>
     </p:extLst>
   </p:cSld>
@@ -6502,15 +6502,32 @@
           </a:p>
         </p:txBody>
       </p:sp>
+      <p:sp>
+        <p:nvSpPr>
+          <p:cNvPr id="4" name="Content Placeholder 3"/>
+          <p:cNvSpPr>
+            <a:spLocks noGrp="1"/>
+          </p:cNvSpPr>
+          <p:nvPr>
+            <p:ph idx="1"/>
+          </p:nvPr>
+        </p:nvSpPr>
+        <p:spPr/>
+        <p:txBody>
+          <a:bodyPr/>
+          <a:lstStyle/>
+          <a:p>
+            <a:endParaRPr lang="en-US"/>
+          </a:p>
+        </p:txBody>
+      </p:sp>
       <p:pic>
         <p:nvPicPr>
-          <p:cNvPr id="1026" name="Picture 2"/>
+          <p:cNvPr id="3" name="Picture 2"/>
           <p:cNvPicPr>
-            <a:picLocks noGrp="1" noChangeAspect="1" noChangeArrowheads="1"/>
+            <a:picLocks noChangeAspect="1" noChangeArrowheads="1"/>
           </p:cNvPicPr>
-          <p:nvPr>
-            <p:ph idx="1"/>
-          </p:nvPr>
+          <p:nvPr/>
         </p:nvPicPr>
         <p:blipFill>
           <a:blip r:embed="rId2"/>
@@ -6521,8 +6538,8 @@
         </p:blipFill>
         <p:spPr bwMode="auto">
           <a:xfrm>
-            <a:off x="1852550" y="712519"/>
-            <a:ext cx="8312727" cy="5984998"/>
+            <a:off x="676894" y="819397"/>
+            <a:ext cx="10711542" cy="5664530"/>
           </a:xfrm>
           <a:prstGeom prst="rect">
             <a:avLst/>
@@ -6648,7 +6665,7 @@
     </p:spTree>
     <p:extLst>
       <p:ext uri="{BB962C8B-B14F-4D97-AF65-F5344CB8AC3E}">
-        <p14:creationId xmlns:p14="http://schemas.microsoft.com/office/powerpoint/2010/main" xmlns="" val="2234607762"/>
+        <p14:creationId xmlns="" xmlns:p14="http://schemas.microsoft.com/office/powerpoint/2010/main" val="2234607762"/>
       </p:ext>
     </p:extLst>
   </p:cSld>
@@ -6819,7 +6836,7 @@
     </p:spTree>
     <p:extLst>
       <p:ext uri="{BB962C8B-B14F-4D97-AF65-F5344CB8AC3E}">
-        <p14:creationId xmlns:p14="http://schemas.microsoft.com/office/powerpoint/2010/main" xmlns="" val="2068207568"/>
+        <p14:creationId xmlns="" xmlns:p14="http://schemas.microsoft.com/office/powerpoint/2010/main" val="2068207568"/>
       </p:ext>
     </p:extLst>
   </p:cSld>
@@ -6935,7 +6952,7 @@
     </p:spTree>
     <p:extLst>
       <p:ext uri="{BB962C8B-B14F-4D97-AF65-F5344CB8AC3E}">
-        <p14:creationId xmlns:p14="http://schemas.microsoft.com/office/powerpoint/2010/main" xmlns="" val="2504166292"/>
+        <p14:creationId xmlns="" xmlns:p14="http://schemas.microsoft.com/office/powerpoint/2010/main" val="2504166292"/>
       </p:ext>
     </p:extLst>
   </p:cSld>
@@ -7046,7 +7063,7 @@
     </p:spTree>
     <p:extLst>
       <p:ext uri="{BB962C8B-B14F-4D97-AF65-F5344CB8AC3E}">
-        <p14:creationId xmlns:p14="http://schemas.microsoft.com/office/powerpoint/2010/main" xmlns="" val="1620377186"/>
+        <p14:creationId xmlns="" xmlns:p14="http://schemas.microsoft.com/office/powerpoint/2010/main" val="1620377186"/>
       </p:ext>
     </p:extLst>
   </p:cSld>
@@ -7161,7 +7178,7 @@
     </p:spTree>
     <p:extLst>
       <p:ext uri="{BB962C8B-B14F-4D97-AF65-F5344CB8AC3E}">
-        <p14:creationId xmlns:p14="http://schemas.microsoft.com/office/powerpoint/2010/main" xmlns="" val="212756996"/>
+        <p14:creationId xmlns="" xmlns:p14="http://schemas.microsoft.com/office/powerpoint/2010/main" val="212756996"/>
       </p:ext>
     </p:extLst>
   </p:cSld>
@@ -7507,7 +7524,7 @@
   <a:extraClrSchemeLst/>
   <a:extLst>
     <a:ext uri="{05A4C25C-085E-4340-85A3-A5531E510DB2}">
-      <thm15:themeFamily xmlns:thm15="http://schemas.microsoft.com/office/thememl/2012/main" xmlns="" name="Celestial" id="{C4BB2A3D-0E93-4C5F-B0D2-9D3FCE089CC5}" vid="{42E5908D-19A2-46FD-89FA-638B126129EF}"/>
+      <thm15:themeFamily xmlns="" xmlns:thm15="http://schemas.microsoft.com/office/thememl/2012/main" name="Celestial" id="{C4BB2A3D-0E93-4C5F-B0D2-9D3FCE089CC5}" vid="{42E5908D-19A2-46FD-89FA-638B126129EF}"/>
     </a:ext>
   </a:extLst>
 </a:theme>

</xml_diff>